<commit_message>
updated powerpoint to include all datasets
</commit_message>
<xml_diff>
--- a/usanpn dataset presentation for dx699 week 5.pptx
+++ b/usanpn dataset presentation for dx699 week 5.pptx
@@ -5,7 +5,7 @@
     <p:sldMasterId id="2147483840" r:id="rId1"/>
   </p:sldMasterIdLst>
   <p:notesMasterIdLst>
-    <p:notesMasterId r:id="rId11"/>
+    <p:notesMasterId r:id="rId12"/>
   </p:notesMasterIdLst>
   <p:sldIdLst>
     <p:sldId id="256" r:id="rId2"/>
@@ -15,8 +15,9 @@
     <p:sldId id="273" r:id="rId6"/>
     <p:sldId id="274" r:id="rId7"/>
     <p:sldId id="275" r:id="rId8"/>
-    <p:sldId id="284" r:id="rId9"/>
-    <p:sldId id="285" r:id="rId10"/>
+    <p:sldId id="286" r:id="rId9"/>
+    <p:sldId id="284" r:id="rId10"/>
+    <p:sldId id="285" r:id="rId11"/>
   </p:sldIdLst>
   <p:sldSz cx="12192000" cy="6858000"/>
   <p:notesSz cx="6858000" cy="9144000"/>
@@ -131,6 +132,7 @@
             <p14:sldId id="273"/>
             <p14:sldId id="274"/>
             <p14:sldId id="275"/>
+            <p14:sldId id="286"/>
           </p14:sldIdLst>
         </p14:section>
         <p14:section name="Using a Decision Tree to analyze NPN A" id="{F11F8927-DD45-464A-A63F-A07A4ABD9D00}">
@@ -233,7 +235,7 @@
           <a:p>
             <a:fld id="{B496CD0E-327F-D549-BDBD-56D443D8CA83}" type="datetimeFigureOut">
               <a:rPr lang="en-US" smtClean="0"/>
-              <a:t>3/6/25</a:t>
+              <a:t>3/9/25</a:t>
             </a:fld>
             <a:endParaRPr lang="en-US"/>
           </a:p>
@@ -725,7 +727,7 @@
             <a:fld id="{5586B75A-687E-405C-8A0B-8D00578BA2C3}" type="datetimeFigureOut">
               <a:rPr lang="en-US" dirty="0"/>
               <a:pPr/>
-              <a:t>3/6/25</a:t>
+              <a:t>3/9/25</a:t>
             </a:fld>
             <a:endParaRPr lang="en-US" dirty="0"/>
           </a:p>
@@ -892,7 +894,7 @@
             <a:fld id="{5586B75A-687E-405C-8A0B-8D00578BA2C3}" type="datetimeFigureOut">
               <a:rPr lang="en-US" dirty="0"/>
               <a:pPr/>
-              <a:t>3/6/25</a:t>
+              <a:t>3/9/25</a:t>
             </a:fld>
             <a:endParaRPr lang="en-US" dirty="0"/>
           </a:p>
@@ -1069,7 +1071,7 @@
             <a:fld id="{5586B75A-687E-405C-8A0B-8D00578BA2C3}" type="datetimeFigureOut">
               <a:rPr lang="en-US" dirty="0"/>
               <a:pPr/>
-              <a:t>3/6/25</a:t>
+              <a:t>3/9/25</a:t>
             </a:fld>
             <a:endParaRPr lang="en-US" dirty="0"/>
           </a:p>
@@ -1236,7 +1238,7 @@
             <a:fld id="{5586B75A-687E-405C-8A0B-8D00578BA2C3}" type="datetimeFigureOut">
               <a:rPr lang="en-US" dirty="0"/>
               <a:pPr/>
-              <a:t>3/6/25</a:t>
+              <a:t>3/9/25</a:t>
             </a:fld>
             <a:endParaRPr lang="en-US" dirty="0"/>
           </a:p>
@@ -1491,7 +1493,7 @@
             <a:fld id="{5586B75A-687E-405C-8A0B-8D00578BA2C3}" type="datetimeFigureOut">
               <a:rPr lang="en-US" dirty="0"/>
               <a:pPr/>
-              <a:t>3/6/25</a:t>
+              <a:t>3/9/25</a:t>
             </a:fld>
             <a:endParaRPr lang="en-US" dirty="0"/>
           </a:p>
@@ -1776,7 +1778,7 @@
             <a:fld id="{5586B75A-687E-405C-8A0B-8D00578BA2C3}" type="datetimeFigureOut">
               <a:rPr lang="en-US" dirty="0"/>
               <a:pPr/>
-              <a:t>3/6/25</a:t>
+              <a:t>3/9/25</a:t>
             </a:fld>
             <a:endParaRPr lang="en-US" dirty="0"/>
           </a:p>
@@ -2215,7 +2217,7 @@
             <a:fld id="{5586B75A-687E-405C-8A0B-8D00578BA2C3}" type="datetimeFigureOut">
               <a:rPr lang="en-US" dirty="0"/>
               <a:pPr/>
-              <a:t>3/6/25</a:t>
+              <a:t>3/9/25</a:t>
             </a:fld>
             <a:endParaRPr lang="en-US" dirty="0"/>
           </a:p>
@@ -2330,7 +2332,7 @@
             <a:fld id="{5586B75A-687E-405C-8A0B-8D00578BA2C3}" type="datetimeFigureOut">
               <a:rPr lang="en-US" dirty="0"/>
               <a:pPr/>
-              <a:t>3/6/25</a:t>
+              <a:t>3/9/25</a:t>
             </a:fld>
             <a:endParaRPr lang="en-US" dirty="0"/>
           </a:p>
@@ -2422,7 +2424,7 @@
             <a:fld id="{5586B75A-687E-405C-8A0B-8D00578BA2C3}" type="datetimeFigureOut">
               <a:rPr lang="en-US" dirty="0"/>
               <a:pPr/>
-              <a:t>3/6/25</a:t>
+              <a:t>3/9/25</a:t>
             </a:fld>
             <a:endParaRPr lang="en-US" dirty="0"/>
           </a:p>
@@ -2707,7 +2709,7 @@
             <a:fld id="{5586B75A-687E-405C-8A0B-8D00578BA2C3}" type="datetimeFigureOut">
               <a:rPr lang="en-US" dirty="0"/>
               <a:pPr/>
-              <a:t>3/6/25</a:t>
+              <a:t>3/9/25</a:t>
             </a:fld>
             <a:endParaRPr lang="en-US" dirty="0"/>
           </a:p>
@@ -2977,7 +2979,7 @@
             <a:fld id="{5586B75A-687E-405C-8A0B-8D00578BA2C3}" type="datetimeFigureOut">
               <a:rPr lang="en-US" dirty="0"/>
               <a:pPr/>
-              <a:t>3/6/25</a:t>
+              <a:t>3/9/25</a:t>
             </a:fld>
             <a:endParaRPr lang="en-US" dirty="0"/>
           </a:p>
@@ -3271,7 +3273,7 @@
             <a:fld id="{5586B75A-687E-405C-8A0B-8D00578BA2C3}" type="datetimeFigureOut">
               <a:rPr lang="en-US" dirty="0"/>
               <a:pPr/>
-              <a:t>3/6/25</a:t>
+              <a:t>3/9/25</a:t>
             </a:fld>
             <a:endParaRPr lang="en-US" dirty="0"/>
           </a:p>
@@ -3873,7 +3875,7 @@
         <p:spPr>
           <a:xfrm>
             <a:off x="1100015" y="3195546"/>
-            <a:ext cx="7389010" cy="923330"/>
+            <a:ext cx="7389010" cy="1477328"/>
           </a:xfrm>
           <a:prstGeom prst="rect">
             <a:avLst/>
@@ -3927,12 +3929,291 @@
               <a:t>Student tuition dataset</a:t>
             </a:r>
           </a:p>
+          <a:p>
+            <a:pPr marL="285750" indent="-285750">
+              <a:buFont typeface="Arial" panose="020B0604020202020204" pitchFamily="34" charset="0"/>
+              <a:buChar char="•"/>
+            </a:pPr>
+            <a:r>
+              <a:rPr lang="en-US" dirty="0">
+                <a:solidFill>
+                  <a:schemeClr val="bg1"/>
+                </a:solidFill>
+              </a:rPr>
+              <a:t>Zip Codes dataset</a:t>
+            </a:r>
+          </a:p>
+          <a:p>
+            <a:pPr marL="285750" indent="-285750">
+              <a:buFont typeface="Arial" panose="020B0604020202020204" pitchFamily="34" charset="0"/>
+              <a:buChar char="•"/>
+            </a:pPr>
+            <a:r>
+              <a:rPr lang="en-US" dirty="0">
+                <a:solidFill>
+                  <a:schemeClr val="bg1"/>
+                </a:solidFill>
+              </a:rPr>
+              <a:t>Healthcare Procedures Dataset</a:t>
+            </a:r>
+          </a:p>
         </p:txBody>
       </p:sp>
     </p:spTree>
     <p:extLst>
       <p:ext uri="{BB962C8B-B14F-4D97-AF65-F5344CB8AC3E}">
         <p14:creationId xmlns:p14="http://schemas.microsoft.com/office/powerpoint/2010/main" val="1132289175"/>
+      </p:ext>
+    </p:extLst>
+  </p:cSld>
+  <p:clrMapOvr>
+    <a:masterClrMapping/>
+  </p:clrMapOvr>
+</p:sld>
+</file>
+
+<file path=ppt/slides/slide10.xml><?xml version="1.0" encoding="utf-8"?>
+<p:sld xmlns:a="http://schemas.openxmlformats.org/drawingml/2006/main" xmlns:r="http://schemas.openxmlformats.org/officeDocument/2006/relationships" xmlns:p="http://schemas.openxmlformats.org/presentationml/2006/main">
+  <p:cSld>
+    <p:spTree>
+      <p:nvGrpSpPr>
+        <p:cNvPr id="1" name=""/>
+        <p:cNvGrpSpPr/>
+        <p:nvPr/>
+      </p:nvGrpSpPr>
+      <p:grpSpPr>
+        <a:xfrm>
+          <a:off x="0" y="0"/>
+          <a:ext cx="0" cy="0"/>
+          <a:chOff x="0" y="0"/>
+          <a:chExt cx="0" cy="0"/>
+        </a:xfrm>
+      </p:grpSpPr>
+      <p:sp>
+        <p:nvSpPr>
+          <p:cNvPr id="2" name="TextBox 1">
+            <a:extLst>
+              <a:ext uri="{FF2B5EF4-FFF2-40B4-BE49-F238E27FC236}">
+                <a16:creationId xmlns:a16="http://schemas.microsoft.com/office/drawing/2014/main" id="{F626D8C2-954D-C53A-675C-049161878EF7}"/>
+              </a:ext>
+            </a:extLst>
+          </p:cNvPr>
+          <p:cNvSpPr txBox="1"/>
+          <p:nvPr/>
+        </p:nvSpPr>
+        <p:spPr>
+          <a:xfrm>
+            <a:off x="4667250" y="476250"/>
+            <a:ext cx="6215163" cy="6186309"/>
+          </a:xfrm>
+          <a:prstGeom prst="rect">
+            <a:avLst/>
+          </a:prstGeom>
+          <a:noFill/>
+        </p:spPr>
+        <p:txBody>
+          <a:bodyPr wrap="none" rtlCol="0">
+            <a:spAutoFit/>
+          </a:bodyPr>
+          <a:lstStyle/>
+          <a:p>
+            <a:r>
+              <a:rPr lang="en-US" dirty="0"/>
+              <a:t>If species id matches</a:t>
+            </a:r>
+          </a:p>
+          <a:p>
+            <a:r>
+              <a:rPr lang="en-US" dirty="0"/>
+              <a:t>	if </a:t>
+            </a:r>
+            <a:r>
+              <a:rPr lang="en-US" dirty="0" err="1"/>
+              <a:t>Indivdual</a:t>
+            </a:r>
+            <a:r>
+              <a:rPr lang="en-US" dirty="0"/>
+              <a:t> ID matches</a:t>
+            </a:r>
+          </a:p>
+          <a:p>
+            <a:r>
+              <a:rPr lang="en-US" dirty="0"/>
+              <a:t>		If </a:t>
+            </a:r>
+            <a:r>
+              <a:rPr lang="en-US" dirty="0" err="1"/>
+              <a:t>phenophase</a:t>
+            </a:r>
+            <a:r>
+              <a:rPr lang="en-US" dirty="0"/>
+              <a:t> category indicates flowering or cones</a:t>
+            </a:r>
+          </a:p>
+          <a:p>
+            <a:r>
+              <a:rPr lang="en-US" dirty="0"/>
+              <a:t>			if historical temperature is up</a:t>
+            </a:r>
+          </a:p>
+          <a:p>
+            <a:r>
+              <a:rPr lang="en-US" dirty="0"/>
+              <a:t>				If precipitation is up</a:t>
+            </a:r>
+          </a:p>
+          <a:p>
+            <a:r>
+              <a:rPr lang="en-US" dirty="0"/>
+              <a:t>					set target to survived</a:t>
+            </a:r>
+          </a:p>
+          <a:p>
+            <a:r>
+              <a:rPr lang="en-US" dirty="0"/>
+              <a:t>				else (precipitation is down)</a:t>
+            </a:r>
+          </a:p>
+          <a:p>
+            <a:r>
+              <a:rPr lang="en-US" dirty="0"/>
+              <a:t>					set target to died</a:t>
+            </a:r>
+          </a:p>
+          <a:p>
+            <a:r>
+              <a:rPr lang="en-US" dirty="0"/>
+              <a:t>			if historical temperature is down</a:t>
+            </a:r>
+          </a:p>
+          <a:p>
+            <a:r>
+              <a:rPr lang="en-US" dirty="0"/>
+              <a:t>				if precipitation is down</a:t>
+            </a:r>
+          </a:p>
+          <a:p>
+            <a:r>
+              <a:rPr lang="en-US" dirty="0"/>
+              <a:t>					set target to died</a:t>
+            </a:r>
+          </a:p>
+          <a:p>
+            <a:r>
+              <a:rPr lang="en-US" dirty="0"/>
+              <a:t>				else </a:t>
+            </a:r>
+          </a:p>
+          <a:p>
+            <a:r>
+              <a:rPr lang="en-US" dirty="0"/>
+              <a:t>					set target to survived</a:t>
+            </a:r>
+          </a:p>
+          <a:p>
+            <a:r>
+              <a:rPr lang="en-US" dirty="0"/>
+              <a:t>		else (</a:t>
+            </a:r>
+            <a:r>
+              <a:rPr lang="en-US" dirty="0" err="1"/>
+              <a:t>phenophase</a:t>
+            </a:r>
+            <a:r>
+              <a:rPr lang="en-US" dirty="0"/>
+              <a:t> doesn’t indicate flowering or cones)</a:t>
+            </a:r>
+          </a:p>
+          <a:p>
+            <a:r>
+              <a:rPr lang="en-US" dirty="0"/>
+              <a:t>			if there is a next observation</a:t>
+            </a:r>
+          </a:p>
+          <a:p>
+            <a:r>
+              <a:rPr lang="en-US" dirty="0"/>
+              <a:t>				set target to survived</a:t>
+            </a:r>
+          </a:p>
+          <a:p>
+            <a:r>
+              <a:rPr lang="en-US" dirty="0"/>
+              <a:t>			</a:t>
+            </a:r>
+            <a:r>
+              <a:rPr lang="en-US" dirty="0" err="1"/>
+              <a:t>elif</a:t>
+            </a:r>
+            <a:r>
+              <a:rPr lang="en-US" dirty="0"/>
+              <a:t> no next observation </a:t>
+            </a:r>
+          </a:p>
+          <a:p>
+            <a:r>
+              <a:rPr lang="en-US" dirty="0"/>
+              <a:t>				set target to died</a:t>
+            </a:r>
+          </a:p>
+          <a:p>
+            <a:r>
+              <a:rPr lang="en-US" dirty="0"/>
+              <a:t>			else </a:t>
+            </a:r>
+          </a:p>
+          <a:p>
+            <a:r>
+              <a:rPr lang="en-US" dirty="0"/>
+              <a:t>				set target to died</a:t>
+            </a:r>
+          </a:p>
+          <a:p>
+            <a:r>
+              <a:rPr lang="en-US" dirty="0"/>
+              <a:t>	else (individual does not match)</a:t>
+            </a:r>
+          </a:p>
+          <a:p>
+            <a:r>
+              <a:rPr lang="en-US" dirty="0"/>
+              <a:t>		loop again</a:t>
+            </a:r>
+          </a:p>
+        </p:txBody>
+      </p:sp>
+      <p:sp>
+        <p:nvSpPr>
+          <p:cNvPr id="3" name="Title 2">
+            <a:extLst>
+              <a:ext uri="{FF2B5EF4-FFF2-40B4-BE49-F238E27FC236}">
+                <a16:creationId xmlns:a16="http://schemas.microsoft.com/office/drawing/2014/main" id="{7EC7EEBD-C4FE-A7DC-1B0F-9131F324C98C}"/>
+              </a:ext>
+            </a:extLst>
+          </p:cNvPr>
+          <p:cNvSpPr>
+            <a:spLocks noGrp="1"/>
+          </p:cNvSpPr>
+          <p:nvPr>
+            <p:ph type="title"/>
+          </p:nvPr>
+        </p:nvSpPr>
+        <p:spPr/>
+        <p:txBody>
+          <a:bodyPr/>
+          <a:lstStyle/>
+          <a:p>
+            <a:r>
+              <a:rPr lang="en-US" dirty="0"/>
+              <a:t>USA NPN A dataset decision tree pseudo code</a:t>
+            </a:r>
+          </a:p>
+        </p:txBody>
+      </p:sp>
+    </p:spTree>
+    <p:extLst>
+      <p:ext uri="{BB962C8B-B14F-4D97-AF65-F5344CB8AC3E}">
+        <p14:creationId xmlns:p14="http://schemas.microsoft.com/office/powerpoint/2010/main" val="3921506457"/>
       </p:ext>
     </p:extLst>
   </p:cSld>
@@ -14761,6 +15042,485 @@
 </file>
 
 <file path=ppt/slides/slide8.xml><?xml version="1.0" encoding="utf-8"?>
+<p:sld xmlns:a="http://schemas.openxmlformats.org/drawingml/2006/main" xmlns:r="http://schemas.openxmlformats.org/officeDocument/2006/relationships" xmlns:p="http://schemas.openxmlformats.org/presentationml/2006/main">
+  <p:cSld>
+    <p:spTree>
+      <p:nvGrpSpPr>
+        <p:cNvPr id="1" name="">
+          <a:extLst>
+            <a:ext uri="{FF2B5EF4-FFF2-40B4-BE49-F238E27FC236}">
+              <a16:creationId xmlns:a16="http://schemas.microsoft.com/office/drawing/2014/main" id="{B70BDD12-DA44-835F-D0ED-4170530F9AC8}"/>
+            </a:ext>
+          </a:extLst>
+        </p:cNvPr>
+        <p:cNvGrpSpPr/>
+        <p:nvPr/>
+      </p:nvGrpSpPr>
+      <p:grpSpPr>
+        <a:xfrm>
+          <a:off x="0" y="0"/>
+          <a:ext cx="0" cy="0"/>
+          <a:chOff x="0" y="0"/>
+          <a:chExt cx="0" cy="0"/>
+        </a:xfrm>
+      </p:grpSpPr>
+      <p:sp>
+        <p:nvSpPr>
+          <p:cNvPr id="2" name="Title 1">
+            <a:extLst>
+              <a:ext uri="{FF2B5EF4-FFF2-40B4-BE49-F238E27FC236}">
+                <a16:creationId xmlns:a16="http://schemas.microsoft.com/office/drawing/2014/main" id="{19607BAB-2E1F-118B-2685-4022B7BC35F9}"/>
+              </a:ext>
+            </a:extLst>
+          </p:cNvPr>
+          <p:cNvSpPr>
+            <a:spLocks noGrp="1"/>
+          </p:cNvSpPr>
+          <p:nvPr>
+            <p:ph type="title"/>
+          </p:nvPr>
+        </p:nvSpPr>
+        <p:spPr>
+          <a:xfrm>
+            <a:off x="252919" y="1123837"/>
+            <a:ext cx="2947482" cy="1755997"/>
+          </a:xfrm>
+        </p:spPr>
+        <p:txBody>
+          <a:bodyPr>
+            <a:normAutofit fontScale="90000"/>
+          </a:bodyPr>
+          <a:lstStyle/>
+          <a:p>
+            <a:r>
+              <a:rPr lang="en-US" dirty="0"/>
+              <a:t>The Health care procedures dataset</a:t>
+            </a:r>
+          </a:p>
+        </p:txBody>
+      </p:sp>
+      <p:sp>
+        <p:nvSpPr>
+          <p:cNvPr id="5" name="Title 1">
+            <a:extLst>
+              <a:ext uri="{FF2B5EF4-FFF2-40B4-BE49-F238E27FC236}">
+                <a16:creationId xmlns:a16="http://schemas.microsoft.com/office/drawing/2014/main" id="{E0088346-3193-A64A-5372-DB0D6AE8E638}"/>
+              </a:ext>
+            </a:extLst>
+          </p:cNvPr>
+          <p:cNvSpPr txBox="1">
+            <a:spLocks/>
+          </p:cNvSpPr>
+          <p:nvPr/>
+        </p:nvSpPr>
+        <p:spPr>
+          <a:xfrm>
+            <a:off x="252919" y="2879833"/>
+            <a:ext cx="2947482" cy="2854329"/>
+          </a:xfrm>
+          <a:prstGeom prst="rect">
+            <a:avLst/>
+          </a:prstGeom>
+        </p:spPr>
+        <p:txBody>
+          <a:bodyPr vert="horz" lIns="91440" tIns="45720" rIns="91440" bIns="45720" rtlCol="0" anchor="ctr">
+            <a:normAutofit/>
+          </a:bodyPr>
+          <a:lstStyle>
+            <a:lvl1pPr algn="l" defTabSz="914400" rtl="0" eaLnBrk="1" latinLnBrk="0" hangingPunct="1">
+              <a:lnSpc>
+                <a:spcPct val="90000"/>
+              </a:lnSpc>
+              <a:spcBef>
+                <a:spcPct val="0"/>
+              </a:spcBef>
+              <a:buNone/>
+              <a:defRPr sz="3600" kern="1200" spc="-60" baseline="0">
+                <a:solidFill>
+                  <a:srgbClr val="FFFFFF"/>
+                </a:solidFill>
+                <a:latin typeface="+mj-lt"/>
+                <a:ea typeface="+mj-ea"/>
+                <a:cs typeface="+mj-cs"/>
+              </a:defRPr>
+            </a:lvl1pPr>
+          </a:lstStyle>
+          <a:p>
+            <a:pPr marL="342900" indent="-342900">
+              <a:buFont typeface="Arial" panose="020B0604020202020204" pitchFamily="34" charset="0"/>
+              <a:buChar char="•"/>
+            </a:pPr>
+            <a:r>
+              <a:rPr lang="en-US" sz="2000" dirty="0"/>
+              <a:t>Snippet</a:t>
+            </a:r>
+          </a:p>
+          <a:p>
+            <a:pPr marL="342900" indent="-342900">
+              <a:buFont typeface="Arial" panose="020B0604020202020204" pitchFamily="34" charset="0"/>
+              <a:buChar char="•"/>
+            </a:pPr>
+            <a:r>
+              <a:rPr lang="en-US" sz="2000" dirty="0"/>
+              <a:t>Value</a:t>
+            </a:r>
+          </a:p>
+          <a:p>
+            <a:pPr marL="342900" indent="-342900">
+              <a:buFont typeface="Arial" panose="020B0604020202020204" pitchFamily="34" charset="0"/>
+              <a:buChar char="•"/>
+            </a:pPr>
+            <a:r>
+              <a:rPr lang="en-US" sz="2000" dirty="0"/>
+              <a:t>Questions</a:t>
+            </a:r>
+          </a:p>
+          <a:p>
+            <a:pPr marL="342900" indent="-342900">
+              <a:buFont typeface="Arial" panose="020B0604020202020204" pitchFamily="34" charset="0"/>
+              <a:buChar char="•"/>
+            </a:pPr>
+            <a:r>
+              <a:rPr lang="en-US" sz="2000" dirty="0"/>
+              <a:t>Features</a:t>
+            </a:r>
+          </a:p>
+          <a:p>
+            <a:pPr marL="800100" lvl="1" indent="-342900">
+              <a:buFont typeface="Arial" panose="020B0604020202020204" pitchFamily="34" charset="0"/>
+              <a:buChar char="•"/>
+            </a:pPr>
+            <a:r>
+              <a:rPr lang="en-US" sz="1400" dirty="0"/>
+              <a:t>Procedure Type</a:t>
+            </a:r>
+          </a:p>
+          <a:p>
+            <a:pPr marL="800100" lvl="1" indent="-342900">
+              <a:buFont typeface="Arial" panose="020B0604020202020204" pitchFamily="34" charset="0"/>
+              <a:buChar char="•"/>
+            </a:pPr>
+            <a:r>
+              <a:rPr lang="en-US" sz="1400" dirty="0"/>
+              <a:t>Facility Type</a:t>
+            </a:r>
+          </a:p>
+          <a:p>
+            <a:pPr marL="800100" lvl="1" indent="-342900">
+              <a:buFont typeface="Arial" panose="020B0604020202020204" pitchFamily="34" charset="0"/>
+              <a:buChar char="•"/>
+            </a:pPr>
+            <a:r>
+              <a:rPr lang="en-US" sz="1400" dirty="0"/>
+              <a:t>Facility location</a:t>
+            </a:r>
+          </a:p>
+          <a:p>
+            <a:pPr marL="800100" lvl="1" indent="-342900">
+              <a:buFont typeface="Arial" panose="020B0604020202020204" pitchFamily="34" charset="0"/>
+              <a:buChar char="•"/>
+            </a:pPr>
+            <a:r>
+              <a:rPr lang="en-US" sz="1400" dirty="0"/>
+              <a:t>Type of plan</a:t>
+            </a:r>
+          </a:p>
+          <a:p>
+            <a:pPr marL="800100" lvl="1" indent="-342900">
+              <a:buFont typeface="Arial" panose="020B0604020202020204" pitchFamily="34" charset="0"/>
+              <a:buChar char="•"/>
+            </a:pPr>
+            <a:r>
+              <a:rPr lang="en-US" sz="1400" dirty="0"/>
+              <a:t>State</a:t>
+            </a:r>
+          </a:p>
+          <a:p>
+            <a:pPr marL="800100" lvl="1" indent="-342900">
+              <a:buFont typeface="Arial" panose="020B0604020202020204" pitchFamily="34" charset="0"/>
+              <a:buChar char="•"/>
+            </a:pPr>
+            <a:r>
+              <a:rPr lang="en-US" sz="1400" dirty="0"/>
+              <a:t>Year</a:t>
+            </a:r>
+          </a:p>
+          <a:p>
+            <a:pPr marL="800100" lvl="1" indent="-342900">
+              <a:buFont typeface="Arial" panose="020B0604020202020204" pitchFamily="34" charset="0"/>
+              <a:buChar char="•"/>
+            </a:pPr>
+            <a:endParaRPr lang="en-US" sz="200" dirty="0"/>
+          </a:p>
+        </p:txBody>
+      </p:sp>
+      <p:sp>
+        <p:nvSpPr>
+          <p:cNvPr id="6" name="TextBox 5">
+            <a:extLst>
+              <a:ext uri="{FF2B5EF4-FFF2-40B4-BE49-F238E27FC236}">
+                <a16:creationId xmlns:a16="http://schemas.microsoft.com/office/drawing/2014/main" id="{393432A3-3D05-4FDD-5069-C169F8B9C0D4}"/>
+              </a:ext>
+            </a:extLst>
+          </p:cNvPr>
+          <p:cNvSpPr txBox="1"/>
+          <p:nvPr/>
+        </p:nvSpPr>
+        <p:spPr>
+          <a:xfrm>
+            <a:off x="8796576" y="421500"/>
+            <a:ext cx="2900855" cy="307777"/>
+          </a:xfrm>
+          <a:prstGeom prst="rect">
+            <a:avLst/>
+          </a:prstGeom>
+          <a:noFill/>
+        </p:spPr>
+        <p:txBody>
+          <a:bodyPr wrap="square" rtlCol="0">
+            <a:spAutoFit/>
+          </a:bodyPr>
+          <a:lstStyle/>
+          <a:p>
+            <a:r>
+              <a:rPr lang="en-US" sz="1400" dirty="0"/>
+              <a:t>Perceived value of dataset</a:t>
+            </a:r>
+          </a:p>
+        </p:txBody>
+      </p:sp>
+      <p:sp>
+        <p:nvSpPr>
+          <p:cNvPr id="7" name="TextBox 6">
+            <a:extLst>
+              <a:ext uri="{FF2B5EF4-FFF2-40B4-BE49-F238E27FC236}">
+                <a16:creationId xmlns:a16="http://schemas.microsoft.com/office/drawing/2014/main" id="{2D2C8447-9D68-8C75-3F85-E43720EFB2D7}"/>
+              </a:ext>
+            </a:extLst>
+          </p:cNvPr>
+          <p:cNvSpPr txBox="1"/>
+          <p:nvPr/>
+        </p:nvSpPr>
+        <p:spPr>
+          <a:xfrm>
+            <a:off x="8922418" y="764871"/>
+            <a:ext cx="2659982" cy="5632311"/>
+          </a:xfrm>
+          <a:prstGeom prst="rect">
+            <a:avLst/>
+          </a:prstGeom>
+          <a:noFill/>
+        </p:spPr>
+        <p:txBody>
+          <a:bodyPr wrap="square" rtlCol="0">
+            <a:spAutoFit/>
+          </a:bodyPr>
+          <a:lstStyle/>
+          <a:p>
+            <a:pPr marL="285750" indent="-285750">
+              <a:buFont typeface="Arial" panose="020B0604020202020204" pitchFamily="34" charset="0"/>
+              <a:buChar char="•"/>
+            </a:pPr>
+            <a:r>
+              <a:rPr lang="en-US" dirty="0"/>
+              <a:t>This dataset is valuable in the type of information contained in it.</a:t>
+            </a:r>
+          </a:p>
+          <a:p>
+            <a:pPr marL="285750" indent="-285750">
+              <a:buFont typeface="Arial" panose="020B0604020202020204" pitchFamily="34" charset="0"/>
+              <a:buChar char="•"/>
+            </a:pPr>
+            <a:r>
+              <a:rPr lang="en-US" dirty="0"/>
+              <a:t>One can ascertain from the data various attributes that may make a procedure more likely to be covered by insurance and in so doing define the best procedures to get at any given time.</a:t>
+            </a:r>
+          </a:p>
+          <a:p>
+            <a:pPr marL="285750" indent="-285750">
+              <a:buFont typeface="Arial" panose="020B0604020202020204" pitchFamily="34" charset="0"/>
+              <a:buChar char="•"/>
+            </a:pPr>
+            <a:r>
+              <a:rPr lang="en-US" dirty="0"/>
+              <a:t>This would also be valuable to an institution because it speaks to which insurance would pay the most for which procedures.</a:t>
+            </a:r>
+          </a:p>
+        </p:txBody>
+      </p:sp>
+      <p:sp>
+        <p:nvSpPr>
+          <p:cNvPr id="8" name="TextBox 7">
+            <a:extLst>
+              <a:ext uri="{FF2B5EF4-FFF2-40B4-BE49-F238E27FC236}">
+                <a16:creationId xmlns:a16="http://schemas.microsoft.com/office/drawing/2014/main" id="{6406670C-FDF6-9A3E-97D3-F6A338C2F409}"/>
+              </a:ext>
+            </a:extLst>
+          </p:cNvPr>
+          <p:cNvSpPr txBox="1"/>
+          <p:nvPr/>
+        </p:nvSpPr>
+        <p:spPr>
+          <a:xfrm>
+            <a:off x="4186873" y="395539"/>
+            <a:ext cx="1903855" cy="369332"/>
+          </a:xfrm>
+          <a:prstGeom prst="rect">
+            <a:avLst/>
+          </a:prstGeom>
+          <a:noFill/>
+        </p:spPr>
+        <p:txBody>
+          <a:bodyPr wrap="none" rtlCol="0">
+            <a:spAutoFit/>
+          </a:bodyPr>
+          <a:lstStyle/>
+          <a:p>
+            <a:r>
+              <a:rPr lang="en-US" dirty="0"/>
+              <a:t>    Dataset Snippet</a:t>
+            </a:r>
+          </a:p>
+        </p:txBody>
+      </p:sp>
+      <p:sp>
+        <p:nvSpPr>
+          <p:cNvPr id="12" name="TextBox 11">
+            <a:extLst>
+              <a:ext uri="{FF2B5EF4-FFF2-40B4-BE49-F238E27FC236}">
+                <a16:creationId xmlns:a16="http://schemas.microsoft.com/office/drawing/2014/main" id="{0E80D810-74B9-4815-464D-5836D1ED0977}"/>
+              </a:ext>
+            </a:extLst>
+          </p:cNvPr>
+          <p:cNvSpPr txBox="1"/>
+          <p:nvPr/>
+        </p:nvSpPr>
+        <p:spPr>
+          <a:xfrm>
+            <a:off x="3592172" y="3988531"/>
+            <a:ext cx="5515040" cy="2862322"/>
+          </a:xfrm>
+          <a:prstGeom prst="rect">
+            <a:avLst/>
+          </a:prstGeom>
+          <a:noFill/>
+        </p:spPr>
+        <p:txBody>
+          <a:bodyPr wrap="square" rtlCol="0">
+            <a:spAutoFit/>
+          </a:bodyPr>
+          <a:lstStyle/>
+          <a:p>
+            <a:r>
+              <a:rPr lang="en-US" dirty="0"/>
+              <a:t>Questions that could be answered using this dataset:</a:t>
+            </a:r>
+          </a:p>
+          <a:p>
+            <a:pPr marL="285750" indent="-285750">
+              <a:buFont typeface="Arial" panose="020B0604020202020204" pitchFamily="34" charset="0"/>
+              <a:buChar char="•"/>
+            </a:pPr>
+            <a:r>
+              <a:rPr lang="en-US" dirty="0"/>
+              <a:t>How likely is a procedure going to be covered, if performed in a certain type of facility?</a:t>
+            </a:r>
+          </a:p>
+          <a:p>
+            <a:pPr marL="285750" indent="-285750">
+              <a:buFont typeface="Arial" panose="020B0604020202020204" pitchFamily="34" charset="0"/>
+              <a:buChar char="•"/>
+            </a:pPr>
+            <a:r>
+              <a:rPr lang="en-US" dirty="0"/>
+              <a:t>Which types of plan are most likely to cover which procedures?</a:t>
+            </a:r>
+          </a:p>
+          <a:p>
+            <a:pPr marL="285750" indent="-285750">
+              <a:buFont typeface="Arial" panose="020B0604020202020204" pitchFamily="34" charset="0"/>
+              <a:buChar char="•"/>
+            </a:pPr>
+            <a:r>
+              <a:rPr lang="en-US" dirty="0"/>
+              <a:t>Do some states/locales have better coverage than others?</a:t>
+            </a:r>
+          </a:p>
+          <a:p>
+            <a:pPr marL="285750" indent="-285750">
+              <a:buFont typeface="Arial" panose="020B0604020202020204" pitchFamily="34" charset="0"/>
+              <a:buChar char="•"/>
+            </a:pPr>
+            <a:r>
+              <a:rPr lang="en-US" dirty="0"/>
+              <a:t>Does the date have any impact on the coverage amount?</a:t>
+            </a:r>
+          </a:p>
+          <a:p>
+            <a:pPr marL="285750" indent="-285750">
+              <a:buFont typeface="Arial" panose="020B0604020202020204" pitchFamily="34" charset="0"/>
+              <a:buChar char="•"/>
+            </a:pPr>
+            <a:endParaRPr lang="en-US" dirty="0"/>
+          </a:p>
+        </p:txBody>
+      </p:sp>
+      <p:pic>
+        <p:nvPicPr>
+          <p:cNvPr id="3" name="Picture 2">
+            <a:extLst>
+              <a:ext uri="{FF2B5EF4-FFF2-40B4-BE49-F238E27FC236}">
+                <a16:creationId xmlns:a16="http://schemas.microsoft.com/office/drawing/2014/main" id="{1D6866A2-E7C4-E074-2F41-F89D20EDFD0C}"/>
+              </a:ext>
+            </a:extLst>
+          </p:cNvPr>
+          <p:cNvPicPr>
+            <a:picLocks noChangeAspect="1"/>
+          </p:cNvPicPr>
+          <p:nvPr/>
+        </p:nvPicPr>
+        <p:blipFill>
+          <a:blip r:embed="rId2"/>
+          <a:stretch>
+            <a:fillRect/>
+          </a:stretch>
+        </p:blipFill>
+        <p:spPr>
+          <a:xfrm>
+            <a:off x="3859770" y="764871"/>
+            <a:ext cx="4786488" cy="2854328"/>
+          </a:xfrm>
+          <a:prstGeom prst="rect">
+            <a:avLst/>
+          </a:prstGeom>
+        </p:spPr>
+      </p:pic>
+    </p:spTree>
+    <p:extLst>
+      <p:ext uri="{BB962C8B-B14F-4D97-AF65-F5344CB8AC3E}">
+        <p14:creationId xmlns:p14="http://schemas.microsoft.com/office/powerpoint/2010/main" val="2854817341"/>
+      </p:ext>
+    </p:extLst>
+  </p:cSld>
+  <p:clrMapOvr>
+    <a:masterClrMapping/>
+  </p:clrMapOvr>
+  <mc:AlternateContent xmlns:mc="http://schemas.openxmlformats.org/markup-compatibility/2006">
+    <mc:Choice xmlns:p15="http://schemas.microsoft.com/office/powerpoint/2012/main" Requires="p15">
+      <p:transition xmlns:p14="http://schemas.microsoft.com/office/powerpoint/2010/main" spd="slow" p14:dur="1250">
+        <p15:prstTrans prst="pageCurlDouble"/>
+      </p:transition>
+    </mc:Choice>
+    <mc:Fallback>
+      <p:transition spd="slow">
+        <p:fade/>
+      </p:transition>
+    </mc:Fallback>
+  </mc:AlternateContent>
+</p:sld>
+</file>
+
+<file path=ppt/slides/slide9.xml><?xml version="1.0" encoding="utf-8"?>
 <p:sld xmlns:a="http://schemas.openxmlformats.org/drawingml/2006/main" xmlns:r="http://schemas.openxmlformats.org/officeDocument/2006/relationships" xmlns:p="http://schemas.openxmlformats.org/presentationml/2006/main">
   <p:cSld>
     <p:spTree>
@@ -18677,257 +19437,6 @@
 </p:sld>
 </file>
 
-<file path=ppt/slides/slide9.xml><?xml version="1.0" encoding="utf-8"?>
-<p:sld xmlns:a="http://schemas.openxmlformats.org/drawingml/2006/main" xmlns:r="http://schemas.openxmlformats.org/officeDocument/2006/relationships" xmlns:p="http://schemas.openxmlformats.org/presentationml/2006/main">
-  <p:cSld>
-    <p:spTree>
-      <p:nvGrpSpPr>
-        <p:cNvPr id="1" name=""/>
-        <p:cNvGrpSpPr/>
-        <p:nvPr/>
-      </p:nvGrpSpPr>
-      <p:grpSpPr>
-        <a:xfrm>
-          <a:off x="0" y="0"/>
-          <a:ext cx="0" cy="0"/>
-          <a:chOff x="0" y="0"/>
-          <a:chExt cx="0" cy="0"/>
-        </a:xfrm>
-      </p:grpSpPr>
-      <p:sp>
-        <p:nvSpPr>
-          <p:cNvPr id="2" name="TextBox 1">
-            <a:extLst>
-              <a:ext uri="{FF2B5EF4-FFF2-40B4-BE49-F238E27FC236}">
-                <a16:creationId xmlns:a16="http://schemas.microsoft.com/office/drawing/2014/main" id="{F626D8C2-954D-C53A-675C-049161878EF7}"/>
-              </a:ext>
-            </a:extLst>
-          </p:cNvPr>
-          <p:cNvSpPr txBox="1"/>
-          <p:nvPr/>
-        </p:nvSpPr>
-        <p:spPr>
-          <a:xfrm>
-            <a:off x="4667250" y="476250"/>
-            <a:ext cx="6215163" cy="6186309"/>
-          </a:xfrm>
-          <a:prstGeom prst="rect">
-            <a:avLst/>
-          </a:prstGeom>
-          <a:noFill/>
-        </p:spPr>
-        <p:txBody>
-          <a:bodyPr wrap="none" rtlCol="0">
-            <a:spAutoFit/>
-          </a:bodyPr>
-          <a:lstStyle/>
-          <a:p>
-            <a:r>
-              <a:rPr lang="en-US" dirty="0"/>
-              <a:t>If species id matches</a:t>
-            </a:r>
-          </a:p>
-          <a:p>
-            <a:r>
-              <a:rPr lang="en-US" dirty="0"/>
-              <a:t>	if </a:t>
-            </a:r>
-            <a:r>
-              <a:rPr lang="en-US" dirty="0" err="1"/>
-              <a:t>Indivdual</a:t>
-            </a:r>
-            <a:r>
-              <a:rPr lang="en-US" dirty="0"/>
-              <a:t> ID matches</a:t>
-            </a:r>
-          </a:p>
-          <a:p>
-            <a:r>
-              <a:rPr lang="en-US" dirty="0"/>
-              <a:t>		If </a:t>
-            </a:r>
-            <a:r>
-              <a:rPr lang="en-US" dirty="0" err="1"/>
-              <a:t>phenophase</a:t>
-            </a:r>
-            <a:r>
-              <a:rPr lang="en-US" dirty="0"/>
-              <a:t> category indicates flowering or cones</a:t>
-            </a:r>
-          </a:p>
-          <a:p>
-            <a:r>
-              <a:rPr lang="en-US" dirty="0"/>
-              <a:t>			if historical temperature is up</a:t>
-            </a:r>
-          </a:p>
-          <a:p>
-            <a:r>
-              <a:rPr lang="en-US" dirty="0"/>
-              <a:t>				If precipitation is up</a:t>
-            </a:r>
-          </a:p>
-          <a:p>
-            <a:r>
-              <a:rPr lang="en-US" dirty="0"/>
-              <a:t>					set target to survived</a:t>
-            </a:r>
-          </a:p>
-          <a:p>
-            <a:r>
-              <a:rPr lang="en-US" dirty="0"/>
-              <a:t>				else (precipitation is down)</a:t>
-            </a:r>
-          </a:p>
-          <a:p>
-            <a:r>
-              <a:rPr lang="en-US" dirty="0"/>
-              <a:t>					set target to died</a:t>
-            </a:r>
-          </a:p>
-          <a:p>
-            <a:r>
-              <a:rPr lang="en-US" dirty="0"/>
-              <a:t>			if historical temperature is down</a:t>
-            </a:r>
-          </a:p>
-          <a:p>
-            <a:r>
-              <a:rPr lang="en-US" dirty="0"/>
-              <a:t>				if precipitation is down</a:t>
-            </a:r>
-          </a:p>
-          <a:p>
-            <a:r>
-              <a:rPr lang="en-US" dirty="0"/>
-              <a:t>					set target to died</a:t>
-            </a:r>
-          </a:p>
-          <a:p>
-            <a:r>
-              <a:rPr lang="en-US" dirty="0"/>
-              <a:t>				else </a:t>
-            </a:r>
-          </a:p>
-          <a:p>
-            <a:r>
-              <a:rPr lang="en-US" dirty="0"/>
-              <a:t>					set target to survived</a:t>
-            </a:r>
-          </a:p>
-          <a:p>
-            <a:r>
-              <a:rPr lang="en-US" dirty="0"/>
-              <a:t>		else (</a:t>
-            </a:r>
-            <a:r>
-              <a:rPr lang="en-US" dirty="0" err="1"/>
-              <a:t>phenophase</a:t>
-            </a:r>
-            <a:r>
-              <a:rPr lang="en-US" dirty="0"/>
-              <a:t> doesn’t indicate flowering or cones)</a:t>
-            </a:r>
-          </a:p>
-          <a:p>
-            <a:r>
-              <a:rPr lang="en-US" dirty="0"/>
-              <a:t>			if there is a next observation</a:t>
-            </a:r>
-          </a:p>
-          <a:p>
-            <a:r>
-              <a:rPr lang="en-US" dirty="0"/>
-              <a:t>				set target to survived</a:t>
-            </a:r>
-          </a:p>
-          <a:p>
-            <a:r>
-              <a:rPr lang="en-US" dirty="0"/>
-              <a:t>			</a:t>
-            </a:r>
-            <a:r>
-              <a:rPr lang="en-US" dirty="0" err="1"/>
-              <a:t>elif</a:t>
-            </a:r>
-            <a:r>
-              <a:rPr lang="en-US" dirty="0"/>
-              <a:t> no next observation </a:t>
-            </a:r>
-          </a:p>
-          <a:p>
-            <a:r>
-              <a:rPr lang="en-US" dirty="0"/>
-              <a:t>				set target to died</a:t>
-            </a:r>
-          </a:p>
-          <a:p>
-            <a:r>
-              <a:rPr lang="en-US" dirty="0"/>
-              <a:t>			else </a:t>
-            </a:r>
-          </a:p>
-          <a:p>
-            <a:r>
-              <a:rPr lang="en-US" dirty="0"/>
-              <a:t>				set target to died</a:t>
-            </a:r>
-          </a:p>
-          <a:p>
-            <a:r>
-              <a:rPr lang="en-US" dirty="0"/>
-              <a:t>	else (individual does not match)</a:t>
-            </a:r>
-          </a:p>
-          <a:p>
-            <a:r>
-              <a:rPr lang="en-US" dirty="0"/>
-              <a:t>		loop again</a:t>
-            </a:r>
-          </a:p>
-        </p:txBody>
-      </p:sp>
-      <p:sp>
-        <p:nvSpPr>
-          <p:cNvPr id="3" name="Title 2">
-            <a:extLst>
-              <a:ext uri="{FF2B5EF4-FFF2-40B4-BE49-F238E27FC236}">
-                <a16:creationId xmlns:a16="http://schemas.microsoft.com/office/drawing/2014/main" id="{7EC7EEBD-C4FE-A7DC-1B0F-9131F324C98C}"/>
-              </a:ext>
-            </a:extLst>
-          </p:cNvPr>
-          <p:cNvSpPr>
-            <a:spLocks noGrp="1"/>
-          </p:cNvSpPr>
-          <p:nvPr>
-            <p:ph type="title"/>
-          </p:nvPr>
-        </p:nvSpPr>
-        <p:spPr/>
-        <p:txBody>
-          <a:bodyPr/>
-          <a:lstStyle/>
-          <a:p>
-            <a:r>
-              <a:rPr lang="en-US" dirty="0"/>
-              <a:t>USA NPN A dataset decision tree pseudo code</a:t>
-            </a:r>
-          </a:p>
-        </p:txBody>
-      </p:sp>
-    </p:spTree>
-    <p:extLst>
-      <p:ext uri="{BB962C8B-B14F-4D97-AF65-F5344CB8AC3E}">
-        <p14:creationId xmlns:p14="http://schemas.microsoft.com/office/powerpoint/2010/main" val="3921506457"/>
-      </p:ext>
-    </p:extLst>
-  </p:cSld>
-  <p:clrMapOvr>
-    <a:masterClrMapping/>
-  </p:clrMapOvr>
-</p:sld>
-</file>
-
 <file path=ppt/theme/theme1.xml><?xml version="1.0" encoding="utf-8"?>
 <a:theme xmlns:a="http://schemas.openxmlformats.org/drawingml/2006/main" name="Frame">
   <a:themeElements>

</xml_diff>